<commit_message>
move from webcorp to english corpora for kwic
</commit_message>
<xml_diff>
--- a/presentations/distributional-semantics.pptx
+++ b/presentations/distributional-semantics.pptx
@@ -234,7 +234,7 @@
           <a:p>
             <a:fld id="{06220CBB-D972-D444-8592-B23A7758CEF7}" type="datetimeFigureOut">
               <a:rPr lang="en-US" smtClean="0"/>
-              <a:t>1/18/26</a:t>
+              <a:t>1/20/26</a:t>
             </a:fld>
             <a:endParaRPr lang="en-US"/>
           </a:p>
@@ -1434,7 +1434,7 @@
             <a:fld id="{46D46D31-4F81-C84C-9C9E-CC304FB2B6EB}" type="datetimeFigureOut">
               <a:rPr lang="en-US" smtClean="0"/>
               <a:pPr/>
-              <a:t>1/18/26</a:t>
+              <a:t>1/20/26</a:t>
             </a:fld>
             <a:endParaRPr lang="en-US" dirty="0"/>
           </a:p>
@@ -2159,7 +2159,7 @@
             <a:fld id="{46D46D31-4F81-C84C-9C9E-CC304FB2B6EB}" type="datetimeFigureOut">
               <a:rPr lang="en-US" smtClean="0"/>
               <a:pPr/>
-              <a:t>1/18/26</a:t>
+              <a:t>1/20/26</a:t>
             </a:fld>
             <a:endParaRPr lang="en-US" dirty="0"/>
           </a:p>
@@ -2849,7 +2849,7 @@
             <a:fld id="{46D46D31-4F81-C84C-9C9E-CC304FB2B6EB}" type="datetimeFigureOut">
               <a:rPr lang="en-US" smtClean="0"/>
               <a:pPr/>
-              <a:t>1/18/26</a:t>
+              <a:t>1/20/26</a:t>
             </a:fld>
             <a:endParaRPr lang="en-US" dirty="0"/>
           </a:p>
@@ -3410,7 +3410,7 @@
             <a:fld id="{46D46D31-4F81-C84C-9C9E-CC304FB2B6EB}" type="datetimeFigureOut">
               <a:rPr lang="en-US" smtClean="0"/>
               <a:pPr/>
-              <a:t>1/18/26</a:t>
+              <a:t>1/20/26</a:t>
             </a:fld>
             <a:endParaRPr lang="en-US" dirty="0"/>
           </a:p>
@@ -4023,7 +4023,7 @@
             <a:fld id="{46D46D31-4F81-C84C-9C9E-CC304FB2B6EB}" type="datetimeFigureOut">
               <a:rPr lang="en-US" smtClean="0"/>
               <a:pPr/>
-              <a:t>1/18/26</a:t>
+              <a:t>1/20/26</a:t>
             </a:fld>
             <a:endParaRPr lang="en-US" dirty="0"/>
           </a:p>
@@ -4651,7 +4651,7 @@
             <a:fld id="{46D46D31-4F81-C84C-9C9E-CC304FB2B6EB}" type="datetimeFigureOut">
               <a:rPr lang="en-US" smtClean="0"/>
               <a:pPr/>
-              <a:t>1/18/26</a:t>
+              <a:t>1/20/26</a:t>
             </a:fld>
             <a:endParaRPr lang="en-US" dirty="0"/>
           </a:p>
@@ -5265,7 +5265,7 @@
             <a:fld id="{46D46D31-4F81-C84C-9C9E-CC304FB2B6EB}" type="datetimeFigureOut">
               <a:rPr lang="en-US" smtClean="0"/>
               <a:pPr/>
-              <a:t>1/18/26</a:t>
+              <a:t>1/20/26</a:t>
             </a:fld>
             <a:endParaRPr lang="en-US" dirty="0"/>
           </a:p>
@@ -5765,7 +5765,7 @@
             <a:fld id="{46D46D31-4F81-C84C-9C9E-CC304FB2B6EB}" type="datetimeFigureOut">
               <a:rPr lang="en-US" smtClean="0"/>
               <a:pPr/>
-              <a:t>1/18/26</a:t>
+              <a:t>1/20/26</a:t>
             </a:fld>
             <a:endParaRPr lang="en-US" dirty="0"/>
           </a:p>
@@ -6484,7 +6484,7 @@
             <a:fld id="{46D46D31-4F81-C84C-9C9E-CC304FB2B6EB}" type="datetimeFigureOut">
               <a:rPr lang="en-US" smtClean="0"/>
               <a:pPr/>
-              <a:t>1/18/26</a:t>
+              <a:t>1/20/26</a:t>
             </a:fld>
             <a:endParaRPr lang="en-US" dirty="0"/>
           </a:p>
@@ -7640,7 +7640,7 @@
             <a:fld id="{46D46D31-4F81-C84C-9C9E-CC304FB2B6EB}" type="datetimeFigureOut">
               <a:rPr lang="en-US" smtClean="0"/>
               <a:pPr/>
-              <a:t>1/18/26</a:t>
+              <a:t>1/20/26</a:t>
             </a:fld>
             <a:endParaRPr lang="en-US" dirty="0"/>
           </a:p>
@@ -9571,7 +9571,7 @@
           <a:p>
             <a:fld id="{51054624-0223-5041-BD13-AE5BA7BAECFD}" type="datetimeFigureOut">
               <a:rPr lang="en-GB" smtClean="0"/>
-              <a:t>18/01/2026</a:t>
+              <a:t>20/01/2026</a:t>
             </a:fld>
             <a:endParaRPr lang="en-GB"/>
           </a:p>
@@ -13538,10 +13538,10 @@
       </p:sp>
       <p:pic>
         <p:nvPicPr>
-          <p:cNvPr id="4" name="Picture 3">
+          <p:cNvPr id="3" name="Picture 2">
             <a:extLst>
               <a:ext uri="{FF2B5EF4-FFF2-40B4-BE49-F238E27FC236}">
-                <a16:creationId xmlns:a16="http://schemas.microsoft.com/office/drawing/2014/main" id="{895EA72E-FD64-92B8-F504-27FC567F6AAB}"/>
+                <a16:creationId xmlns:a16="http://schemas.microsoft.com/office/drawing/2014/main" id="{E17FD6BC-B95D-9B20-CCF6-AF7F327E52C5}"/>
               </a:ext>
             </a:extLst>
           </p:cNvPr>
@@ -13550,15 +13550,16 @@
           </p:cNvPicPr>
           <p:nvPr/>
         </p:nvPicPr>
-        <p:blipFill rotWithShape="1">
+        <p:blipFill>
           <a:blip r:embed="rId2"/>
-          <a:srcRect l="2602" t="2539" r="2888" b="4887"/>
-          <a:stretch/>
+          <a:stretch>
+            <a:fillRect/>
+          </a:stretch>
         </p:blipFill>
         <p:spPr>
           <a:xfrm>
-            <a:off x="341375" y="900000"/>
-            <a:ext cx="9144001" cy="6018750"/>
+            <a:off x="158650" y="540000"/>
+            <a:ext cx="9791261" cy="6572023"/>
           </a:xfrm>
           <a:prstGeom prst="rect">
             <a:avLst/>
@@ -13579,8 +13580,8 @@
         </p:nvSpPr>
         <p:spPr>
           <a:xfrm>
-            <a:off x="7760964" y="5496335"/>
-            <a:ext cx="4089661" cy="461665"/>
+            <a:off x="7361695" y="5496335"/>
+            <a:ext cx="4830305" cy="461665"/>
           </a:xfrm>
           <a:prstGeom prst="rect">
             <a:avLst/>
@@ -13620,7 +13621,7 @@
                   </a:extLst>
                 </a:hlinkClick>
               </a:rPr>
-              <a:t>https://www.webcorp.org.uk/</a:t>
+              <a:t>https://www.english-corpora.org/</a:t>
             </a:r>
             <a:endParaRPr lang="en-US" sz="2400" b="1" dirty="0">
               <a:solidFill>
@@ -14391,6 +14392,15 @@
 </file>
 
 <file path=customXml/item1.xml><?xml version="1.0" encoding="utf-8"?>
+<?mso-contentType ?>
+<FormTemplates xmlns="http://schemas.microsoft.com/sharepoint/v3/contenttype/forms">
+  <Display>DocumentLibraryForm</Display>
+  <Edit>DocumentLibraryForm</Edit>
+  <New>DocumentLibraryForm</New>
+</FormTemplates>
+</file>
+
+<file path=customXml/item2.xml><?xml version="1.0" encoding="utf-8"?>
 <ct:contentTypeSchema xmlns:ct="http://schemas.microsoft.com/office/2006/metadata/contentType" xmlns:ma="http://schemas.microsoft.com/office/2006/metadata/properties/metaAttributes" ct:_="" ma:_="" ma:contentTypeName="Document" ma:contentTypeID="0x010100B02558F287BC8344AD539CDC4DA17FBC" ma:contentTypeVersion="10" ma:contentTypeDescription="Create a new document." ma:contentTypeScope="" ma:versionID="165e8038d85e89d0753c71c915416bd7">
   <xsd:schema xmlns:xsd="http://www.w3.org/2001/XMLSchema" xmlns:xs="http://www.w3.org/2001/XMLSchema" xmlns:p="http://schemas.microsoft.com/office/2006/metadata/properties" xmlns:ns2="a9a9e2ba-2d19-46fe-bf54-0255447a607c" xmlns:ns3="8e67869f-b319-4f8e-812d-d2b9322169ce" targetNamespace="http://schemas.microsoft.com/office/2006/metadata/properties" ma:root="true" ma:fieldsID="abf99e3026b4072fe3426938b59b700a" ns2:_="" ns3:_="">
     <xsd:import namespace="a9a9e2ba-2d19-46fe-bf54-0255447a607c"/>
@@ -14595,15 +14605,6 @@
 </ct:contentTypeSchema>
 </file>
 
-<file path=customXml/item2.xml><?xml version="1.0" encoding="utf-8"?>
-<?mso-contentType ?>
-<FormTemplates xmlns="http://schemas.microsoft.com/sharepoint/v3/contenttype/forms">
-  <Display>DocumentLibraryForm</Display>
-  <Edit>DocumentLibraryForm</Edit>
-  <New>DocumentLibraryForm</New>
-</FormTemplates>
-</file>
-
 <file path=customXml/item3.xml><?xml version="1.0" encoding="utf-8"?>
 <p:properties xmlns:p="http://schemas.microsoft.com/office/2006/metadata/properties" xmlns:xsi="http://www.w3.org/2001/XMLSchema-instance" xmlns:pc="http://schemas.microsoft.com/office/infopath/2007/PartnerControls">
   <documentManagement/>
@@ -14611,6 +14612,14 @@
 </file>
 
 <file path=customXml/itemProps1.xml><?xml version="1.0" encoding="utf-8"?>
+<ds:datastoreItem xmlns:ds="http://schemas.openxmlformats.org/officeDocument/2006/customXml" ds:itemID="{4A9C8777-C6EC-4528-A529-B1E15BCDF7A3}">
+  <ds:schemaRefs>
+    <ds:schemaRef ds:uri="http://schemas.microsoft.com/sharepoint/v3/contenttype/forms"/>
+  </ds:schemaRefs>
+</ds:datastoreItem>
+</file>
+
+<file path=customXml/itemProps2.xml><?xml version="1.0" encoding="utf-8"?>
 <ds:datastoreItem xmlns:ds="http://schemas.openxmlformats.org/officeDocument/2006/customXml" ds:itemID="{91B57E6C-04A0-4EB4-9DC4-971645A5D1A1}">
   <ds:schemaRefs>
     <ds:schemaRef ds:uri="http://schemas.microsoft.com/office/2006/metadata/contentType"/>
@@ -14625,14 +14634,6 @@
     <ds:schemaRef ds:uri="http://purl.org/dc/elements/1.1/"/>
     <ds:schemaRef ds:uri="http://purl.org/dc/terms/"/>
     <ds:schemaRef ds:uri="http://schemas.microsoft.com/internal/obd"/>
-  </ds:schemaRefs>
-</ds:datastoreItem>
-</file>
-
-<file path=customXml/itemProps2.xml><?xml version="1.0" encoding="utf-8"?>
-<ds:datastoreItem xmlns:ds="http://schemas.openxmlformats.org/officeDocument/2006/customXml" ds:itemID="{4A9C8777-C6EC-4528-A529-B1E15BCDF7A3}">
-  <ds:schemaRefs>
-    <ds:schemaRef ds:uri="http://schemas.microsoft.com/sharepoint/v3/contenttype/forms"/>
   </ds:schemaRefs>
 </ds:datastoreItem>
 </file>

</xml_diff>